<commit_message>
final (not winning) ppt
</commit_message>
<xml_diff>
--- a/Team_Laqua_Final_Presentation.pptx
+++ b/Team_Laqua_Final_Presentation.pptx
@@ -3005,38 +3005,24 @@
               <a:t>The impact on Air Pollution</a:t>
             </a:r>
             <a:r>
-              <a:rPr lang="en-US" dirty="0" smtClean="0">
+              <a:rPr lang="en-US" smtClean="0">
                 <a:latin typeface="Cambria" panose="02040503050406030204" pitchFamily="18" charset="0"/>
                 <a:ea typeface="Cambria" panose="02040503050406030204" pitchFamily="18" charset="0"/>
               </a:rPr>
               <a:t/>
             </a:r>
             <a:br>
-              <a:rPr lang="en-US" dirty="0" smtClean="0">
+              <a:rPr lang="en-US" smtClean="0">
                 <a:latin typeface="Cambria" panose="02040503050406030204" pitchFamily="18" charset="0"/>
                 <a:ea typeface="Cambria" panose="02040503050406030204" pitchFamily="18" charset="0"/>
               </a:rPr>
             </a:br>
             <a:r>
-              <a:rPr lang="en-US" b="1" dirty="0" smtClean="0">
-                <a:latin typeface="Cambria" panose="02040503050406030204" pitchFamily="18" charset="0"/>
-                <a:ea typeface="Cambria" panose="02040503050406030204" pitchFamily="18" charset="0"/>
-              </a:rPr>
-              <a:t>BBQs, Traffic</a:t>
-            </a:r>
-            <a:r>
               <a:rPr lang="en-US" b="1" smtClean="0">
                 <a:latin typeface="Cambria" panose="02040503050406030204" pitchFamily="18" charset="0"/>
                 <a:ea typeface="Cambria" panose="02040503050406030204" pitchFamily="18" charset="0"/>
               </a:rPr>
-              <a:t>, </a:t>
-            </a:r>
-            <a:r>
-              <a:rPr lang="en-US" b="1" smtClean="0">
-                <a:latin typeface="Cambria" panose="02040503050406030204" pitchFamily="18" charset="0"/>
-                <a:ea typeface="Cambria" panose="02040503050406030204" pitchFamily="18" charset="0"/>
-              </a:rPr>
-              <a:t>Seasons?</a:t>
+              <a:t>BBQ vs Traffic</a:t>
             </a:r>
             <a:endParaRPr lang="en-US" b="1" dirty="0">
               <a:latin typeface="Cambria" panose="02040503050406030204" pitchFamily="18" charset="0"/>

</xml_diff>